<commit_message>
Update KPI oraz dodanieFrameworki.pptx - Krzysztof Wrobel
</commit_message>
<xml_diff>
--- a/dokumentacja/KPI.pptx
+++ b/dokumentacja/KPI.pptx
@@ -5,14 +5,15 @@
     <p:sldMasterId id="2147483684" r:id="rId1"/>
   </p:sldMasterIdLst>
   <p:notesMasterIdLst>
-    <p:notesMasterId r:id="rId7"/>
+    <p:notesMasterId r:id="rId8"/>
   </p:notesMasterIdLst>
   <p:sldIdLst>
     <p:sldId id="256" r:id="rId2"/>
-    <p:sldId id="257" r:id="rId3"/>
-    <p:sldId id="258" r:id="rId4"/>
-    <p:sldId id="259" r:id="rId5"/>
-    <p:sldId id="260" r:id="rId6"/>
+    <p:sldId id="261" r:id="rId3"/>
+    <p:sldId id="257" r:id="rId4"/>
+    <p:sldId id="258" r:id="rId5"/>
+    <p:sldId id="259" r:id="rId6"/>
+    <p:sldId id="260" r:id="rId7"/>
   </p:sldIdLst>
   <p:sldSz cx="9144000" cy="6858000" type="screen4x3"/>
   <p:notesSz cx="6858000" cy="9144000"/>
@@ -196,7 +197,7 @@
           <a:p>
             <a:fld id="{37DC3296-9053-4083-A9F5-3FB783EC4801}" type="datetimeFigureOut">
               <a:rPr lang="pl-PL" smtClean="0"/>
-              <a:t>2015-02-23</a:t>
+              <a:t>2015-02-25</a:t>
             </a:fld>
             <a:endParaRPr lang="pl-PL"/>
           </a:p>
@@ -529,7 +530,7 @@
           <a:p>
             <a:fld id="{67356B71-AD80-4702-B42F-AC2C1783E287}" type="slidenum">
               <a:rPr lang="pl-PL" smtClean="0"/>
-              <a:t>5</a:t>
+              <a:t>6</a:t>
             </a:fld>
             <a:endParaRPr lang="pl-PL"/>
           </a:p>
@@ -3305,7 +3306,7 @@
           <a:p>
             <a:fld id="{44EFD900-5584-47B7-979D-A14F5E9CD50E}" type="datetimeFigureOut">
               <a:rPr lang="pl-PL" smtClean="0"/>
-              <a:t>2015-02-23</a:t>
+              <a:t>2015-02-25</a:t>
             </a:fld>
             <a:endParaRPr lang="pl-PL"/>
           </a:p>
@@ -3590,7 +3591,7 @@
           <a:p>
             <a:fld id="{44EFD900-5584-47B7-979D-A14F5E9CD50E}" type="datetimeFigureOut">
               <a:rPr lang="pl-PL" smtClean="0"/>
-              <a:t>2015-02-23</a:t>
+              <a:t>2015-02-25</a:t>
             </a:fld>
             <a:endParaRPr lang="pl-PL"/>
           </a:p>
@@ -3765,7 +3766,7 @@
           <a:p>
             <a:fld id="{44EFD900-5584-47B7-979D-A14F5E9CD50E}" type="datetimeFigureOut">
               <a:rPr lang="pl-PL" smtClean="0"/>
-              <a:t>2015-02-23</a:t>
+              <a:t>2015-02-25</a:t>
             </a:fld>
             <a:endParaRPr lang="pl-PL"/>
           </a:p>
@@ -3930,7 +3931,7 @@
           <a:p>
             <a:fld id="{44EFD900-5584-47B7-979D-A14F5E9CD50E}" type="datetimeFigureOut">
               <a:rPr lang="pl-PL" smtClean="0"/>
-              <a:t>2015-02-23</a:t>
+              <a:t>2015-02-25</a:t>
             </a:fld>
             <a:endParaRPr lang="pl-PL"/>
           </a:p>
@@ -4171,7 +4172,7 @@
           <a:p>
             <a:fld id="{44EFD900-5584-47B7-979D-A14F5E9CD50E}" type="datetimeFigureOut">
               <a:rPr lang="pl-PL" smtClean="0"/>
-              <a:t>2015-02-23</a:t>
+              <a:t>2015-02-25</a:t>
             </a:fld>
             <a:endParaRPr lang="pl-PL"/>
           </a:p>
@@ -4284,7 +4285,7 @@
           <a:p>
             <a:fld id="{44EFD900-5584-47B7-979D-A14F5E9CD50E}" type="datetimeFigureOut">
               <a:rPr lang="pl-PL" smtClean="0"/>
-              <a:t>2015-02-23</a:t>
+              <a:t>2015-02-25</a:t>
             </a:fld>
             <a:endParaRPr lang="pl-PL"/>
           </a:p>
@@ -4823,7 +4824,7 @@
           <a:p>
             <a:fld id="{44EFD900-5584-47B7-979D-A14F5E9CD50E}" type="datetimeFigureOut">
               <a:rPr lang="pl-PL" smtClean="0"/>
-              <a:t>2015-02-23</a:t>
+              <a:t>2015-02-25</a:t>
             </a:fld>
             <a:endParaRPr lang="pl-PL"/>
           </a:p>
@@ -4936,7 +4937,7 @@
           <a:p>
             <a:fld id="{44EFD900-5584-47B7-979D-A14F5E9CD50E}" type="datetimeFigureOut">
               <a:rPr lang="pl-PL" smtClean="0"/>
-              <a:t>2015-02-23</a:t>
+              <a:t>2015-02-25</a:t>
             </a:fld>
             <a:endParaRPr lang="pl-PL"/>
           </a:p>
@@ -5026,7 +5027,7 @@
           <a:p>
             <a:fld id="{44EFD900-5584-47B7-979D-A14F5E9CD50E}" type="datetimeFigureOut">
               <a:rPr lang="pl-PL" smtClean="0"/>
-              <a:t>2015-02-23</a:t>
+              <a:t>2015-02-25</a:t>
             </a:fld>
             <a:endParaRPr lang="pl-PL"/>
           </a:p>
@@ -7677,7 +7678,7 @@
           <a:p>
             <a:fld id="{44EFD900-5584-47B7-979D-A14F5E9CD50E}" type="datetimeFigureOut">
               <a:rPr lang="pl-PL" smtClean="0"/>
-              <a:t>2015-02-23</a:t>
+              <a:t>2015-02-25</a:t>
             </a:fld>
             <a:endParaRPr lang="pl-PL"/>
           </a:p>
@@ -10889,7 +10890,7 @@
           <a:p>
             <a:fld id="{44EFD900-5584-47B7-979D-A14F5E9CD50E}" type="datetimeFigureOut">
               <a:rPr lang="pl-PL" smtClean="0"/>
-              <a:t>2015-02-23</a:t>
+              <a:t>2015-02-25</a:t>
             </a:fld>
             <a:endParaRPr lang="pl-PL"/>
           </a:p>
@@ -13711,7 +13712,7 @@
           <a:p>
             <a:fld id="{44EFD900-5584-47B7-979D-A14F5E9CD50E}" type="datetimeFigureOut">
               <a:rPr lang="pl-PL" smtClean="0"/>
-              <a:t>2015-02-23</a:t>
+              <a:t>2015-02-25</a:t>
             </a:fld>
             <a:endParaRPr lang="pl-PL"/>
           </a:p>
@@ -14284,6 +14285,394 @@
           </a:xfrm>
         </p:spPr>
         <p:txBody>
+          <a:bodyPr>
+            <a:normAutofit/>
+          </a:bodyPr>
+          <a:lstStyle/>
+          <a:p>
+            <a:r>
+              <a:rPr lang="pl-PL" sz="3200" dirty="0" smtClean="0"/>
+              <a:t>LISTA TASKÓW NIEPRZYPISANYCH</a:t>
+            </a:r>
+            <a:endParaRPr lang="pl-PL" sz="3200" b="1" dirty="0"/>
+          </a:p>
+        </p:txBody>
+      </p:sp>
+      <p:pic>
+        <p:nvPicPr>
+          <p:cNvPr id="2050" name="Picture 2"/>
+          <p:cNvPicPr>
+            <a:picLocks noChangeAspect="1" noChangeArrowheads="1"/>
+          </p:cNvPicPr>
+          <p:nvPr/>
+        </p:nvPicPr>
+        <p:blipFill>
+          <a:blip r:embed="rId2">
+            <a:extLst>
+              <a:ext uri="{28A0092B-C50C-407E-A947-70E740481C1C}">
+                <a14:useLocalDpi xmlns:a14="http://schemas.microsoft.com/office/drawing/2010/main" val="0"/>
+              </a:ext>
+            </a:extLst>
+          </a:blip>
+          <a:srcRect/>
+          <a:stretch>
+            <a:fillRect/>
+          </a:stretch>
+        </p:blipFill>
+        <p:spPr bwMode="auto">
+          <a:xfrm>
+            <a:off x="611560" y="476672"/>
+            <a:ext cx="432048" cy="833235"/>
+          </a:xfrm>
+          <a:prstGeom prst="rect">
+            <a:avLst/>
+          </a:prstGeom>
+          <a:noFill/>
+          <a:ln>
+            <a:noFill/>
+          </a:ln>
+          <a:effectLst/>
+          <a:extLst>
+            <a:ext uri="{909E8E84-426E-40DD-AFC4-6F175D3DCCD1}">
+              <a14:hiddenFill xmlns:a14="http://schemas.microsoft.com/office/drawing/2010/main">
+                <a:solidFill>
+                  <a:schemeClr val="accent1"/>
+                </a:solidFill>
+              </a14:hiddenFill>
+            </a:ext>
+            <a:ext uri="{91240B29-F687-4F45-9708-019B960494DF}">
+              <a14:hiddenLine xmlns:a14="http://schemas.microsoft.com/office/drawing/2010/main" w="9525">
+                <a:solidFill>
+                  <a:schemeClr val="tx1"/>
+                </a:solidFill>
+                <a:miter lim="800000"/>
+                <a:headEnd/>
+                <a:tailEnd/>
+              </a14:hiddenLine>
+            </a:ext>
+            <a:ext uri="{AF507438-7753-43E0-B8FC-AC1667EBCBE1}">
+              <a14:hiddenEffects xmlns:a14="http://schemas.microsoft.com/office/drawing/2010/main">
+                <a:effectLst>
+                  <a:outerShdw dist="35921" dir="2700000" algn="ctr" rotWithShape="0">
+                    <a:schemeClr val="bg2"/>
+                  </a:outerShdw>
+                </a:effectLst>
+              </a14:hiddenEffects>
+            </a:ext>
+          </a:extLst>
+        </p:spPr>
+      </p:pic>
+      <p:sp>
+        <p:nvSpPr>
+          <p:cNvPr id="4" name="Prostokąt 3"/>
+          <p:cNvSpPr/>
+          <p:nvPr/>
+        </p:nvSpPr>
+        <p:spPr>
+          <a:xfrm>
+            <a:off x="619200" y="1556792"/>
+            <a:ext cx="2224608" cy="756084"/>
+          </a:xfrm>
+          <a:prstGeom prst="rect">
+            <a:avLst/>
+          </a:prstGeom>
+          <a:ln/>
+        </p:spPr>
+        <p:style>
+          <a:lnRef idx="0">
+            <a:schemeClr val="accent6"/>
+          </a:lnRef>
+          <a:fillRef idx="3">
+            <a:schemeClr val="accent6"/>
+          </a:fillRef>
+          <a:effectRef idx="3">
+            <a:schemeClr val="accent6"/>
+          </a:effectRef>
+          <a:fontRef idx="minor">
+            <a:schemeClr val="lt1"/>
+          </a:fontRef>
+        </p:style>
+        <p:txBody>
+          <a:bodyPr rtlCol="0" anchor="ctr"/>
+          <a:lstStyle/>
+          <a:p>
+            <a:pPr algn="ctr"/>
+            <a:r>
+              <a:rPr lang="pl-PL" sz="1600" b="1" dirty="0" smtClean="0"/>
+              <a:t>ROGER:</a:t>
+            </a:r>
+          </a:p>
+          <a:p>
+            <a:pPr algn="ctr"/>
+            <a:r>
+              <a:rPr lang="pl-PL" sz="1600" dirty="0" smtClean="0"/>
+              <a:t>ZAŁOŻENIE PROJEKTU</a:t>
+            </a:r>
+            <a:endParaRPr lang="pl-PL" sz="1600" dirty="0"/>
+          </a:p>
+        </p:txBody>
+      </p:sp>
+      <p:sp>
+        <p:nvSpPr>
+          <p:cNvPr id="14" name="Prostokąt 13"/>
+          <p:cNvSpPr/>
+          <p:nvPr/>
+        </p:nvSpPr>
+        <p:spPr>
+          <a:xfrm>
+            <a:off x="9580376" y="3717032"/>
+            <a:ext cx="1472344" cy="360040"/>
+          </a:xfrm>
+          <a:prstGeom prst="rect">
+            <a:avLst/>
+          </a:prstGeom>
+        </p:spPr>
+        <p:style>
+          <a:lnRef idx="0">
+            <a:schemeClr val="accent1"/>
+          </a:lnRef>
+          <a:fillRef idx="3">
+            <a:schemeClr val="accent1"/>
+          </a:fillRef>
+          <a:effectRef idx="3">
+            <a:schemeClr val="accent1"/>
+          </a:effectRef>
+          <a:fontRef idx="minor">
+            <a:schemeClr val="lt1"/>
+          </a:fontRef>
+        </p:style>
+        <p:txBody>
+          <a:bodyPr rtlCol="0" anchor="ctr"/>
+          <a:lstStyle/>
+          <a:p>
+            <a:pPr algn="ctr"/>
+            <a:r>
+              <a:rPr lang="pl-PL" dirty="0" smtClean="0"/>
+              <a:t>FINISHED</a:t>
+            </a:r>
+            <a:endParaRPr lang="pl-PL" dirty="0"/>
+          </a:p>
+        </p:txBody>
+      </p:sp>
+      <p:sp>
+        <p:nvSpPr>
+          <p:cNvPr id="15" name="Prostokąt 14"/>
+          <p:cNvSpPr/>
+          <p:nvPr/>
+        </p:nvSpPr>
+        <p:spPr>
+          <a:xfrm>
+            <a:off x="9580376" y="3212976"/>
+            <a:ext cx="1472344" cy="360040"/>
+          </a:xfrm>
+          <a:prstGeom prst="rect">
+            <a:avLst/>
+          </a:prstGeom>
+        </p:spPr>
+        <p:style>
+          <a:lnRef idx="0">
+            <a:schemeClr val="accent6"/>
+          </a:lnRef>
+          <a:fillRef idx="3">
+            <a:schemeClr val="accent6"/>
+          </a:fillRef>
+          <a:effectRef idx="3">
+            <a:schemeClr val="accent6"/>
+          </a:effectRef>
+          <a:fontRef idx="minor">
+            <a:schemeClr val="lt1"/>
+          </a:fontRef>
+        </p:style>
+        <p:txBody>
+          <a:bodyPr rtlCol="0" anchor="ctr"/>
+          <a:lstStyle/>
+          <a:p>
+            <a:pPr algn="ctr"/>
+            <a:r>
+              <a:rPr lang="pl-PL" dirty="0" smtClean="0"/>
+              <a:t>ONGOING</a:t>
+            </a:r>
+            <a:endParaRPr lang="pl-PL" dirty="0"/>
+          </a:p>
+        </p:txBody>
+      </p:sp>
+      <p:sp>
+        <p:nvSpPr>
+          <p:cNvPr id="16" name="Prostokąt 15"/>
+          <p:cNvSpPr/>
+          <p:nvPr/>
+        </p:nvSpPr>
+        <p:spPr>
+          <a:xfrm>
+            <a:off x="9580376" y="2708920"/>
+            <a:ext cx="1472344" cy="360040"/>
+          </a:xfrm>
+          <a:prstGeom prst="rect">
+            <a:avLst/>
+          </a:prstGeom>
+          <a:ln>
+            <a:prstDash val="dash"/>
+          </a:ln>
+        </p:spPr>
+        <p:style>
+          <a:lnRef idx="2">
+            <a:schemeClr val="dk1"/>
+          </a:lnRef>
+          <a:fillRef idx="1">
+            <a:schemeClr val="lt1"/>
+          </a:fillRef>
+          <a:effectRef idx="0">
+            <a:schemeClr val="dk1"/>
+          </a:effectRef>
+          <a:fontRef idx="minor">
+            <a:schemeClr val="dk1"/>
+          </a:fontRef>
+        </p:style>
+        <p:txBody>
+          <a:bodyPr rtlCol="0" anchor="ctr"/>
+          <a:lstStyle/>
+          <a:p>
+            <a:pPr algn="ctr"/>
+            <a:r>
+              <a:rPr lang="pl-PL" dirty="0" smtClean="0"/>
+              <a:t>PLANED</a:t>
+            </a:r>
+            <a:endParaRPr lang="pl-PL" dirty="0"/>
+          </a:p>
+        </p:txBody>
+      </p:sp>
+      <p:sp>
+        <p:nvSpPr>
+          <p:cNvPr id="17" name="pole tekstowe 16"/>
+          <p:cNvSpPr txBox="1"/>
+          <p:nvPr/>
+        </p:nvSpPr>
+        <p:spPr>
+          <a:xfrm>
+            <a:off x="9573149" y="2204864"/>
+            <a:ext cx="1479571" cy="369332"/>
+          </a:xfrm>
+          <a:prstGeom prst="rect">
+            <a:avLst/>
+          </a:prstGeom>
+          <a:noFill/>
+        </p:spPr>
+        <p:txBody>
+          <a:bodyPr wrap="square" rtlCol="0">
+            <a:spAutoFit/>
+          </a:bodyPr>
+          <a:lstStyle/>
+          <a:p>
+            <a:pPr algn="ctr"/>
+            <a:r>
+              <a:rPr lang="pl-PL" dirty="0" smtClean="0"/>
+              <a:t>LEGEND:</a:t>
+            </a:r>
+          </a:p>
+        </p:txBody>
+      </p:sp>
+      <p:sp>
+        <p:nvSpPr>
+          <p:cNvPr id="18" name="pole tekstowe 17"/>
+          <p:cNvSpPr txBox="1"/>
+          <p:nvPr/>
+        </p:nvSpPr>
+        <p:spPr>
+          <a:xfrm>
+            <a:off x="9587603" y="4427820"/>
+            <a:ext cx="1465117" cy="369332"/>
+          </a:xfrm>
+          <a:prstGeom prst="rect">
+            <a:avLst/>
+          </a:prstGeom>
+          <a:solidFill>
+            <a:schemeClr val="accent6">
+              <a:alpha val="40000"/>
+            </a:schemeClr>
+          </a:solidFill>
+          <a:ln>
+            <a:solidFill>
+              <a:schemeClr val="tx1"/>
+            </a:solidFill>
+            <a:prstDash val="dash"/>
+          </a:ln>
+          <a:effectLst>
+            <a:glow rad="508000">
+              <a:schemeClr val="accent6">
+                <a:alpha val="40000"/>
+              </a:schemeClr>
+            </a:glow>
+          </a:effectLst>
+        </p:spPr>
+        <p:txBody>
+          <a:bodyPr wrap="square" rtlCol="0">
+            <a:spAutoFit/>
+          </a:bodyPr>
+          <a:lstStyle/>
+          <a:p>
+            <a:pPr algn="ctr"/>
+            <a:r>
+              <a:rPr lang="pl-PL" dirty="0" smtClean="0"/>
+              <a:t>NOTE</a:t>
+            </a:r>
+            <a:endParaRPr lang="pl-PL" dirty="0"/>
+          </a:p>
+        </p:txBody>
+      </p:sp>
+    </p:spTree>
+    <p:extLst>
+      <p:ext uri="{BB962C8B-B14F-4D97-AF65-F5344CB8AC3E}">
+        <p14:creationId xmlns:p14="http://schemas.microsoft.com/office/powerpoint/2010/main" val="2072826362"/>
+      </p:ext>
+    </p:extLst>
+  </p:cSld>
+  <p:clrMapOvr>
+    <a:masterClrMapping/>
+  </p:clrMapOvr>
+  <p:timing>
+    <p:tnLst>
+      <p:par>
+        <p:cTn id="1" dur="indefinite" restart="never" nodeType="tmRoot"/>
+      </p:par>
+    </p:tnLst>
+  </p:timing>
+</p:sld>
+</file>
+
+<file path=ppt/slides/slide3.xml><?xml version="1.0" encoding="utf-8"?>
+<p:sld xmlns:a="http://schemas.openxmlformats.org/drawingml/2006/main" xmlns:r="http://schemas.openxmlformats.org/officeDocument/2006/relationships" xmlns:p="http://schemas.openxmlformats.org/presentationml/2006/main">
+  <p:cSld>
+    <p:spTree>
+      <p:nvGrpSpPr>
+        <p:cNvPr id="1" name=""/>
+        <p:cNvGrpSpPr/>
+        <p:nvPr/>
+      </p:nvGrpSpPr>
+      <p:grpSpPr>
+        <a:xfrm>
+          <a:off x="0" y="0"/>
+          <a:ext cx="0" cy="0"/>
+          <a:chOff x="0" y="0"/>
+          <a:chExt cx="0" cy="0"/>
+        </a:xfrm>
+      </p:grpSpPr>
+      <p:sp>
+        <p:nvSpPr>
+          <p:cNvPr id="2" name="Tytuł 1"/>
+          <p:cNvSpPr>
+            <a:spLocks noGrp="1"/>
+          </p:cNvSpPr>
+          <p:nvPr>
+            <p:ph type="title"/>
+          </p:nvPr>
+        </p:nvSpPr>
+        <p:spPr>
+          <a:xfrm>
+            <a:off x="1331640" y="692696"/>
+            <a:ext cx="7024744" cy="720080"/>
+          </a:xfrm>
+        </p:spPr>
+        <p:txBody>
           <a:bodyPr/>
           <a:lstStyle/>
           <a:p>
@@ -14741,7 +15130,7 @@
 </p:sld>
 </file>
 
-<file path=ppt/slides/slide3.xml><?xml version="1.0" encoding="utf-8"?>
+<file path=ppt/slides/slide4.xml><?xml version="1.0" encoding="utf-8"?>
 <p:sld xmlns:a="http://schemas.openxmlformats.org/drawingml/2006/main" xmlns:r="http://schemas.openxmlformats.org/officeDocument/2006/relationships" xmlns:p="http://schemas.openxmlformats.org/presentationml/2006/main">
   <p:cSld>
     <p:spTree>
@@ -14921,13 +15310,13 @@
         </p:spPr>
         <p:style>
           <a:lnRef idx="0">
-            <a:schemeClr val="accent6"/>
+            <a:schemeClr val="accent1"/>
           </a:lnRef>
           <a:fillRef idx="3">
-            <a:schemeClr val="accent6"/>
+            <a:schemeClr val="accent1"/>
           </a:fillRef>
           <a:effectRef idx="3">
-            <a:schemeClr val="accent6"/>
+            <a:schemeClr val="accent1"/>
           </a:effectRef>
           <a:fontRef idx="minor">
             <a:schemeClr val="lt1"/>
@@ -15269,22 +15658,20 @@
           <a:prstGeom prst="rect">
             <a:avLst/>
           </a:prstGeom>
-          <a:ln>
-            <a:prstDash val="dash"/>
-          </a:ln>
+          <a:ln/>
         </p:spPr>
         <p:style>
-          <a:lnRef idx="2">
-            <a:schemeClr val="dk1"/>
+          <a:lnRef idx="0">
+            <a:schemeClr val="accent6"/>
           </a:lnRef>
-          <a:fillRef idx="1">
-            <a:schemeClr val="lt1"/>
+          <a:fillRef idx="3">
+            <a:schemeClr val="accent6"/>
           </a:fillRef>
-          <a:effectRef idx="0">
-            <a:schemeClr val="dk1"/>
+          <a:effectRef idx="3">
+            <a:schemeClr val="accent6"/>
           </a:effectRef>
           <a:fontRef idx="minor">
-            <a:schemeClr val="dk1"/>
+            <a:schemeClr val="lt1"/>
           </a:fontRef>
         </p:style>
         <p:txBody>
@@ -15294,7 +15681,11 @@
             <a:pPr algn="ctr"/>
             <a:r>
               <a:rPr lang="pl-PL" sz="1600" b="1" dirty="0" smtClean="0"/>
-              <a:t>[T1.4] </a:t>
+              <a:t>[T1.4</a:t>
+            </a:r>
+            <a:r>
+              <a:rPr lang="pl-PL" sz="1600" b="1" dirty="0" smtClean="0"/>
+              <a:t>] KRYSTIAN: </a:t>
             </a:r>
             <a:r>
               <a:rPr lang="pl-PL" sz="1600" dirty="0" smtClean="0"/>
@@ -15343,7 +15734,11 @@
             <a:pPr algn="ctr"/>
             <a:r>
               <a:rPr lang="pl-PL" sz="1600" b="1" dirty="0" smtClean="0"/>
-              <a:t>[T1.4] </a:t>
+              <a:t>[</a:t>
+            </a:r>
+            <a:r>
+              <a:rPr lang="pl-PL" sz="1600" b="1" dirty="0" smtClean="0"/>
+              <a:t>T1.5] </a:t>
             </a:r>
             <a:r>
               <a:rPr lang="pl-PL" sz="1600" dirty="0" smtClean="0"/>
@@ -15390,7 +15785,15 @@
             <a:pPr algn="ctr"/>
             <a:r>
               <a:rPr lang="pl-PL" sz="1600" b="1" dirty="0" smtClean="0"/>
-              <a:t>[T1.4] ROGER: </a:t>
+              <a:t>[</a:t>
+            </a:r>
+            <a:r>
+              <a:rPr lang="pl-PL" sz="1600" b="1" dirty="0" smtClean="0"/>
+              <a:t>T1.6] </a:t>
+            </a:r>
+            <a:r>
+              <a:rPr lang="pl-PL" sz="1600" b="1" dirty="0" smtClean="0"/>
+              <a:t>ROGER: </a:t>
             </a:r>
             <a:r>
               <a:rPr lang="pl-PL" sz="1600" dirty="0" smtClean="0"/>
@@ -15420,7 +15823,7 @@
 </p:sld>
 </file>
 
-<file path=ppt/slides/slide4.xml><?xml version="1.0" encoding="utf-8"?>
+<file path=ppt/slides/slide5.xml><?xml version="1.0" encoding="utf-8"?>
 <p:sld xmlns:a="http://schemas.openxmlformats.org/drawingml/2006/main" xmlns:r="http://schemas.openxmlformats.org/officeDocument/2006/relationships" xmlns:p="http://schemas.openxmlformats.org/presentationml/2006/main">
   <p:cSld>
     <p:spTree>
@@ -15850,22 +16253,20 @@
           <a:prstGeom prst="rect">
             <a:avLst/>
           </a:prstGeom>
-          <a:ln>
-            <a:prstDash val="dash"/>
-          </a:ln>
+          <a:ln/>
         </p:spPr>
         <p:style>
-          <a:lnRef idx="2">
-            <a:schemeClr val="dk1"/>
+          <a:lnRef idx="0">
+            <a:schemeClr val="accent1"/>
           </a:lnRef>
-          <a:fillRef idx="1">
-            <a:schemeClr val="lt1"/>
+          <a:fillRef idx="3">
+            <a:schemeClr val="accent1"/>
           </a:fillRef>
-          <a:effectRef idx="0">
-            <a:schemeClr val="dk1"/>
+          <a:effectRef idx="3">
+            <a:schemeClr val="accent1"/>
           </a:effectRef>
           <a:fontRef idx="minor">
-            <a:schemeClr val="dk1"/>
+            <a:schemeClr val="lt1"/>
           </a:fontRef>
         </p:style>
         <p:txBody>
@@ -15950,13 +16351,13 @@
         </p:spPr>
         <p:style>
           <a:lnRef idx="0">
-            <a:schemeClr val="accent6"/>
+            <a:schemeClr val="accent1"/>
           </a:lnRef>
           <a:fillRef idx="3">
-            <a:schemeClr val="accent6"/>
+            <a:schemeClr val="accent1"/>
           </a:fillRef>
           <a:effectRef idx="3">
-            <a:schemeClr val="accent6"/>
+            <a:schemeClr val="accent1"/>
           </a:effectRef>
           <a:fontRef idx="minor">
             <a:schemeClr val="lt1"/>
@@ -15999,7 +16400,7 @@
 </p:sld>
 </file>
 
-<file path=ppt/slides/slide5.xml><?xml version="1.0" encoding="utf-8"?>
+<file path=ppt/slides/slide6.xml><?xml version="1.0" encoding="utf-8"?>
 <p:sld xmlns:a="http://schemas.openxmlformats.org/drawingml/2006/main" xmlns:r="http://schemas.openxmlformats.org/officeDocument/2006/relationships" xmlns:p="http://schemas.openxmlformats.org/presentationml/2006/main">
   <p:cSld>
     <p:spTree>
@@ -16285,22 +16686,20 @@
           <a:prstGeom prst="rect">
             <a:avLst/>
           </a:prstGeom>
-          <a:ln>
-            <a:prstDash val="dash"/>
-          </a:ln>
+          <a:ln/>
         </p:spPr>
         <p:style>
-          <a:lnRef idx="2">
-            <a:schemeClr val="dk1"/>
+          <a:lnRef idx="0">
+            <a:schemeClr val="accent1"/>
           </a:lnRef>
-          <a:fillRef idx="1">
-            <a:schemeClr val="lt1"/>
+          <a:fillRef idx="3">
+            <a:schemeClr val="accent1"/>
           </a:fillRef>
-          <a:effectRef idx="0">
-            <a:schemeClr val="dk1"/>
+          <a:effectRef idx="3">
+            <a:schemeClr val="accent1"/>
           </a:effectRef>
           <a:fontRef idx="minor">
-            <a:schemeClr val="dk1"/>
+            <a:schemeClr val="lt1"/>
           </a:fontRef>
         </p:style>
         <p:txBody>
@@ -16654,6 +17053,54 @@
               <a:rPr lang="pl-PL" sz="1600" dirty="0" smtClean="0"/>
               <a:t>STWORZENIE KALENDARZA DRAG &amp; DROP Z LISTĄ AGREGATÓW</a:t>
             </a:r>
+          </a:p>
+        </p:txBody>
+      </p:sp>
+      <p:sp>
+        <p:nvSpPr>
+          <p:cNvPr id="20" name="pole tekstowe 19"/>
+          <p:cNvSpPr txBox="1"/>
+          <p:nvPr/>
+        </p:nvSpPr>
+        <p:spPr>
+          <a:xfrm>
+            <a:off x="6012160" y="3702218"/>
+            <a:ext cx="1872208" cy="646331"/>
+          </a:xfrm>
+          <a:prstGeom prst="rect">
+            <a:avLst/>
+          </a:prstGeom>
+          <a:solidFill>
+            <a:schemeClr val="accent6">
+              <a:alpha val="40000"/>
+            </a:schemeClr>
+          </a:solidFill>
+          <a:ln>
+            <a:solidFill>
+              <a:schemeClr val="tx1"/>
+            </a:solidFill>
+            <a:prstDash val="dash"/>
+          </a:ln>
+          <a:effectLst>
+            <a:glow rad="508000">
+              <a:schemeClr val="accent6">
+                <a:alpha val="40000"/>
+              </a:schemeClr>
+            </a:glow>
+          </a:effectLst>
+        </p:spPr>
+        <p:txBody>
+          <a:bodyPr wrap="square" rtlCol="0">
+            <a:spAutoFit/>
+          </a:bodyPr>
+          <a:lstStyle/>
+          <a:p>
+            <a:pPr algn="ctr"/>
+            <a:r>
+              <a:rPr lang="pl-PL" dirty="0" smtClean="0"/>
+              <a:t>Ogranicza nas brak projektu!</a:t>
+            </a:r>
+            <a:endParaRPr lang="pl-PL" dirty="0"/>
           </a:p>
         </p:txBody>
       </p:sp>

</xml_diff>